<commit_message>
new custom link, finished adding text to 2.2
</commit_message>
<xml_diff>
--- a/End Slide Template/Aspen-End-Slide.pptx
+++ b/End Slide Template/Aspen-End-Slide.pptx
@@ -270,7 +270,7 @@
           <a:p>
             <a:fld id="{1436D9A1-CF53-4157-BC0D-4CBC2B505487}" type="datetimeFigureOut">
               <a:rPr lang="en-US" smtClean="0"/>
-              <a:t>6/24/2021</a:t>
+              <a:t>8/29/2021</a:t>
             </a:fld>
             <a:endParaRPr lang="en-US"/>
           </a:p>
@@ -468,7 +468,7 @@
           <a:p>
             <a:fld id="{1436D9A1-CF53-4157-BC0D-4CBC2B505487}" type="datetimeFigureOut">
               <a:rPr lang="en-US" smtClean="0"/>
-              <a:t>6/24/2021</a:t>
+              <a:t>8/29/2021</a:t>
             </a:fld>
             <a:endParaRPr lang="en-US"/>
           </a:p>
@@ -676,7 +676,7 @@
           <a:p>
             <a:fld id="{1436D9A1-CF53-4157-BC0D-4CBC2B505487}" type="datetimeFigureOut">
               <a:rPr lang="en-US" smtClean="0"/>
-              <a:t>6/24/2021</a:t>
+              <a:t>8/29/2021</a:t>
             </a:fld>
             <a:endParaRPr lang="en-US"/>
           </a:p>
@@ -874,7 +874,7 @@
           <a:p>
             <a:fld id="{1436D9A1-CF53-4157-BC0D-4CBC2B505487}" type="datetimeFigureOut">
               <a:rPr lang="en-US" smtClean="0"/>
-              <a:t>6/24/2021</a:t>
+              <a:t>8/29/2021</a:t>
             </a:fld>
             <a:endParaRPr lang="en-US"/>
           </a:p>
@@ -1149,7 +1149,7 @@
           <a:p>
             <a:fld id="{1436D9A1-CF53-4157-BC0D-4CBC2B505487}" type="datetimeFigureOut">
               <a:rPr lang="en-US" smtClean="0"/>
-              <a:t>6/24/2021</a:t>
+              <a:t>8/29/2021</a:t>
             </a:fld>
             <a:endParaRPr lang="en-US"/>
           </a:p>
@@ -1414,7 +1414,7 @@
           <a:p>
             <a:fld id="{1436D9A1-CF53-4157-BC0D-4CBC2B505487}" type="datetimeFigureOut">
               <a:rPr lang="en-US" smtClean="0"/>
-              <a:t>6/24/2021</a:t>
+              <a:t>8/29/2021</a:t>
             </a:fld>
             <a:endParaRPr lang="en-US"/>
           </a:p>
@@ -1826,7 +1826,7 @@
           <a:p>
             <a:fld id="{1436D9A1-CF53-4157-BC0D-4CBC2B505487}" type="datetimeFigureOut">
               <a:rPr lang="en-US" smtClean="0"/>
-              <a:t>6/24/2021</a:t>
+              <a:t>8/29/2021</a:t>
             </a:fld>
             <a:endParaRPr lang="en-US"/>
           </a:p>
@@ -1967,7 +1967,7 @@
           <a:p>
             <a:fld id="{1436D9A1-CF53-4157-BC0D-4CBC2B505487}" type="datetimeFigureOut">
               <a:rPr lang="en-US" smtClean="0"/>
-              <a:t>6/24/2021</a:t>
+              <a:t>8/29/2021</a:t>
             </a:fld>
             <a:endParaRPr lang="en-US"/>
           </a:p>
@@ -2080,7 +2080,7 @@
           <a:p>
             <a:fld id="{1436D9A1-CF53-4157-BC0D-4CBC2B505487}" type="datetimeFigureOut">
               <a:rPr lang="en-US" smtClean="0"/>
-              <a:t>6/24/2021</a:t>
+              <a:t>8/29/2021</a:t>
             </a:fld>
             <a:endParaRPr lang="en-US"/>
           </a:p>
@@ -2391,7 +2391,7 @@
           <a:p>
             <a:fld id="{1436D9A1-CF53-4157-BC0D-4CBC2B505487}" type="datetimeFigureOut">
               <a:rPr lang="en-US" smtClean="0"/>
-              <a:t>6/24/2021</a:t>
+              <a:t>8/29/2021</a:t>
             </a:fld>
             <a:endParaRPr lang="en-US"/>
           </a:p>
@@ -2679,7 +2679,7 @@
           <a:p>
             <a:fld id="{1436D9A1-CF53-4157-BC0D-4CBC2B505487}" type="datetimeFigureOut">
               <a:rPr lang="en-US" smtClean="0"/>
-              <a:t>6/24/2021</a:t>
+              <a:t>8/29/2021</a:t>
             </a:fld>
             <a:endParaRPr lang="en-US"/>
           </a:p>
@@ -2920,7 +2920,7 @@
           <a:p>
             <a:fld id="{1436D9A1-CF53-4157-BC0D-4CBC2B505487}" type="datetimeFigureOut">
               <a:rPr lang="en-US" smtClean="0"/>
-              <a:t>6/24/2021</a:t>
+              <a:t>8/29/2021</a:t>
             </a:fld>
             <a:endParaRPr lang="en-US"/>
           </a:p>
@@ -3427,8 +3427,17 @@
               <a:rPr lang="en-US" sz="2800" dirty="0">
                 <a:latin typeface="Palatino Linotype" panose="02040502050505030304" pitchFamily="18" charset="0"/>
               </a:rPr>
-              <a:t>www.youtube.com/channel/UCEI_I3xF2Pleep34HHVMCpg</a:t>
-            </a:r>
+              <a:t>www.youtube.com</a:t>
+            </a:r>
+            <a:r>
+              <a:rPr lang="en-US" sz="2800">
+                <a:latin typeface="Palatino Linotype" panose="02040502050505030304" pitchFamily="18" charset="0"/>
+              </a:rPr>
+              <a:t>/c/CornellCBE</a:t>
+            </a:r>
+            <a:endParaRPr lang="en-US" sz="2800" dirty="0">
+              <a:latin typeface="Palatino Linotype" panose="02040502050505030304" pitchFamily="18" charset="0"/>
+            </a:endParaRPr>
           </a:p>
           <a:p>
             <a:pPr>

</xml_diff>

<commit_message>
finished adding text to 2.3, 3.1
</commit_message>
<xml_diff>
--- a/End Slide Template/Aspen-End-Slide.pptx
+++ b/End Slide Template/Aspen-End-Slide.pptx
@@ -3427,13 +3427,13 @@
               <a:rPr lang="en-US" sz="2800" dirty="0">
                 <a:latin typeface="Palatino Linotype" panose="02040502050505030304" pitchFamily="18" charset="0"/>
               </a:rPr>
-              <a:t>www.youtube.com</a:t>
+              <a:t>www.youtube.</a:t>
             </a:r>
             <a:r>
               <a:rPr lang="en-US" sz="2800">
                 <a:latin typeface="Palatino Linotype" panose="02040502050505030304" pitchFamily="18" charset="0"/>
               </a:rPr>
-              <a:t>/c/CornellCBE</a:t>
+              <a:t>com/CornellCBE</a:t>
             </a:r>
             <a:endParaRPr lang="en-US" sz="2800" dirty="0">
               <a:latin typeface="Palatino Linotype" panose="02040502050505030304" pitchFamily="18" charset="0"/>

</xml_diff>